<commit_message>
Change texts in view_officer.php
</commit_message>
<xml_diff>
--- a/Crime record management system -1.pptx
+++ b/Crime record management system -1.pptx
@@ -452,7 +452,7 @@
           <a:p>
             <a:fld id="{8247719E-A071-48C4-9162-8C0ACCCA0F96}" type="datetimeFigureOut">
               <a:rPr lang="en-US" smtClean="0"/>
-              <a:t>5/23/2023</a:t>
+              <a:t>6/29/2023</a:t>
             </a:fld>
             <a:endParaRPr lang="en-US"/>
           </a:p>
@@ -776,7 +776,7 @@
           <a:p>
             <a:fld id="{8247719E-A071-48C4-9162-8C0ACCCA0F96}" type="datetimeFigureOut">
               <a:rPr lang="en-US" smtClean="0"/>
-              <a:t>5/23/2023</a:t>
+              <a:t>6/29/2023</a:t>
             </a:fld>
             <a:endParaRPr lang="en-US"/>
           </a:p>
@@ -1024,7 +1024,7 @@
           <a:p>
             <a:fld id="{8247719E-A071-48C4-9162-8C0ACCCA0F96}" type="datetimeFigureOut">
               <a:rPr lang="en-US" smtClean="0"/>
-              <a:t>5/23/2023</a:t>
+              <a:t>6/29/2023</a:t>
             </a:fld>
             <a:endParaRPr lang="en-US"/>
           </a:p>
@@ -1363,7 +1363,7 @@
           <a:p>
             <a:fld id="{8247719E-A071-48C4-9162-8C0ACCCA0F96}" type="datetimeFigureOut">
               <a:rPr lang="en-US" smtClean="0"/>
-              <a:t>5/23/2023</a:t>
+              <a:t>6/29/2023</a:t>
             </a:fld>
             <a:endParaRPr lang="en-US"/>
           </a:p>
@@ -1710,7 +1710,7 @@
           <a:p>
             <a:fld id="{8247719E-A071-48C4-9162-8C0ACCCA0F96}" type="datetimeFigureOut">
               <a:rPr lang="en-US" smtClean="0"/>
-              <a:t>5/23/2023</a:t>
+              <a:t>6/29/2023</a:t>
             </a:fld>
             <a:endParaRPr lang="en-US"/>
           </a:p>
@@ -2084,7 +2084,7 @@
           <a:p>
             <a:fld id="{8247719E-A071-48C4-9162-8C0ACCCA0F96}" type="datetimeFigureOut">
               <a:rPr lang="en-US" smtClean="0"/>
-              <a:t>5/23/2023</a:t>
+              <a:t>6/29/2023</a:t>
             </a:fld>
             <a:endParaRPr lang="en-US"/>
           </a:p>
@@ -2554,7 +2554,7 @@
           <a:p>
             <a:fld id="{8247719E-A071-48C4-9162-8C0ACCCA0F96}" type="datetimeFigureOut">
               <a:rPr lang="en-US" smtClean="0"/>
-              <a:t>5/23/2023</a:t>
+              <a:t>6/29/2023</a:t>
             </a:fld>
             <a:endParaRPr lang="en-US"/>
           </a:p>
@@ -2759,7 +2759,7 @@
           <a:p>
             <a:fld id="{8247719E-A071-48C4-9162-8C0ACCCA0F96}" type="datetimeFigureOut">
               <a:rPr lang="en-US" smtClean="0"/>
-              <a:t>5/23/2023</a:t>
+              <a:t>6/29/2023</a:t>
             </a:fld>
             <a:endParaRPr lang="en-US"/>
           </a:p>
@@ -2970,7 +2970,7 @@
           <a:p>
             <a:fld id="{8247719E-A071-48C4-9162-8C0ACCCA0F96}" type="datetimeFigureOut">
               <a:rPr lang="en-US" smtClean="0"/>
-              <a:t>5/23/2023</a:t>
+              <a:t>6/29/2023</a:t>
             </a:fld>
             <a:endParaRPr lang="en-US"/>
           </a:p>
@@ -3202,7 +3202,7 @@
           <a:p>
             <a:fld id="{8247719E-A071-48C4-9162-8C0ACCCA0F96}" type="datetimeFigureOut">
               <a:rPr lang="en-US" smtClean="0"/>
-              <a:t>5/23/2023</a:t>
+              <a:t>6/29/2023</a:t>
             </a:fld>
             <a:endParaRPr lang="en-US"/>
           </a:p>
@@ -3450,7 +3450,7 @@
           <a:p>
             <a:fld id="{8247719E-A071-48C4-9162-8C0ACCCA0F96}" type="datetimeFigureOut">
               <a:rPr lang="en-US" smtClean="0"/>
-              <a:t>5/23/2023</a:t>
+              <a:t>6/29/2023</a:t>
             </a:fld>
             <a:endParaRPr lang="en-US"/>
           </a:p>
@@ -3748,7 +3748,7 @@
           <a:p>
             <a:fld id="{8247719E-A071-48C4-9162-8C0ACCCA0F96}" type="datetimeFigureOut">
               <a:rPr lang="en-US" smtClean="0"/>
-              <a:t>5/23/2023</a:t>
+              <a:t>6/29/2023</a:t>
             </a:fld>
             <a:endParaRPr lang="en-US"/>
           </a:p>
@@ -4142,7 +4142,7 @@
           <a:p>
             <a:fld id="{8247719E-A071-48C4-9162-8C0ACCCA0F96}" type="datetimeFigureOut">
               <a:rPr lang="en-US" smtClean="0"/>
-              <a:t>5/23/2023</a:t>
+              <a:t>6/29/2023</a:t>
             </a:fld>
             <a:endParaRPr lang="en-US"/>
           </a:p>
@@ -4291,7 +4291,7 @@
           <a:p>
             <a:fld id="{8247719E-A071-48C4-9162-8C0ACCCA0F96}" type="datetimeFigureOut">
               <a:rPr lang="en-US" smtClean="0"/>
-              <a:t>5/23/2023</a:t>
+              <a:t>6/29/2023</a:t>
             </a:fld>
             <a:endParaRPr lang="en-US"/>
           </a:p>
@@ -4417,7 +4417,7 @@
           <a:p>
             <a:fld id="{8247719E-A071-48C4-9162-8C0ACCCA0F96}" type="datetimeFigureOut">
               <a:rPr lang="en-US" smtClean="0"/>
-              <a:t>5/23/2023</a:t>
+              <a:t>6/29/2023</a:t>
             </a:fld>
             <a:endParaRPr lang="en-US"/>
           </a:p>
@@ -4672,7 +4672,7 @@
           <a:p>
             <a:fld id="{8247719E-A071-48C4-9162-8C0ACCCA0F96}" type="datetimeFigureOut">
               <a:rPr lang="en-US" smtClean="0"/>
-              <a:t>5/23/2023</a:t>
+              <a:t>6/29/2023</a:t>
             </a:fld>
             <a:endParaRPr lang="en-US"/>
           </a:p>
@@ -4987,7 +4987,7 @@
           <a:p>
             <a:fld id="{8247719E-A071-48C4-9162-8C0ACCCA0F96}" type="datetimeFigureOut">
               <a:rPr lang="en-US" smtClean="0"/>
-              <a:t>5/23/2023</a:t>
+              <a:t>6/29/2023</a:t>
             </a:fld>
             <a:endParaRPr lang="en-US"/>
           </a:p>
@@ -5338,7 +5338,7 @@
           <a:p>
             <a:fld id="{8247719E-A071-48C4-9162-8C0ACCCA0F96}" type="datetimeFigureOut">
               <a:rPr lang="en-US" smtClean="0"/>
-              <a:t>5/23/2023</a:t>
+              <a:t>6/29/2023</a:t>
             </a:fld>
             <a:endParaRPr lang="en-US"/>
           </a:p>
@@ -5936,11 +5936,23 @@
                 <a:latin typeface="Arial Black" panose="020B0A04020102020204" pitchFamily="34" charset="0"/>
               </a:rPr>
             </a:br>
+            <a:r>
+              <a:rPr lang="en-US" sz="4000" b="1" dirty="0">
+                <a:latin typeface="Arial Black" panose="020B0A04020102020204" pitchFamily="34" charset="0"/>
+              </a:rPr>
+              <a:t/>
+            </a:r>
             <a:br>
               <a:rPr lang="en-US" sz="4000" b="1" dirty="0">
                 <a:latin typeface="Arial Black" panose="020B0A04020102020204" pitchFamily="34" charset="0"/>
               </a:rPr>
             </a:br>
+            <a:r>
+              <a:rPr lang="en-US" sz="4000" b="1" dirty="0">
+                <a:latin typeface="Arial Black" panose="020B0A04020102020204" pitchFamily="34" charset="0"/>
+              </a:rPr>
+              <a:t/>
+            </a:r>
             <a:br>
               <a:rPr lang="en-US" sz="4000" b="1" dirty="0">
                 <a:latin typeface="Arial Black" panose="020B0A04020102020204" pitchFamily="34" charset="0"/>
@@ -6407,9 +6419,10 @@
               <a:buChar char="Ø"/>
             </a:pPr>
             <a:r>
-              <a:rPr lang="en-US" dirty="0"/>
-              <a:t>Data recording</a:t>
-            </a:r>
+              <a:rPr lang="en-US" dirty="0" smtClean="0"/>
+              <a:t>Case registering</a:t>
+            </a:r>
+            <a:endParaRPr lang="en-US" dirty="0"/>
           </a:p>
           <a:p>
             <a:pPr marL="342900" indent="-342900">
@@ -6417,9 +6430,10 @@
               <a:buChar char="Ø"/>
             </a:pPr>
             <a:r>
-              <a:rPr lang="en-US" dirty="0"/>
-              <a:t>Data retrieval</a:t>
-            </a:r>
+              <a:rPr lang="en-US" dirty="0" smtClean="0"/>
+              <a:t>Case management</a:t>
+            </a:r>
+            <a:endParaRPr lang="en-US" dirty="0"/>
           </a:p>
           <a:p>
             <a:pPr marL="342900" indent="-342900">
@@ -6428,27 +6442,12 @@
             </a:pPr>
             <a:r>
               <a:rPr lang="en-US" dirty="0"/>
-              <a:t>Generate reports</a:t>
-            </a:r>
-          </a:p>
-          <a:p>
-            <a:pPr marL="342900" indent="-342900">
-              <a:buFont typeface="Wingdings" panose="05000000000000000000" pitchFamily="2" charset="2"/>
-              <a:buChar char="Ø"/>
-            </a:pPr>
-            <a:r>
-              <a:rPr lang="en-US" dirty="0"/>
-              <a:t>Data sharing</a:t>
-            </a:r>
-          </a:p>
-          <a:p>
-            <a:pPr marL="342900" indent="-342900">
-              <a:buFont typeface="Wingdings" panose="05000000000000000000" pitchFamily="2" charset="2"/>
-              <a:buChar char="Ø"/>
-            </a:pPr>
-            <a:endParaRPr lang="en-US" dirty="0"/>
-          </a:p>
-          <a:p>
+              <a:t>Generate </a:t>
+            </a:r>
+            <a:r>
+              <a:rPr lang="en-US" dirty="0" smtClean="0"/>
+              <a:t>reports</a:t>
+            </a:r>
             <a:endParaRPr lang="en-US" dirty="0"/>
           </a:p>
         </p:txBody>
@@ -7180,9 +7179,10 @@
               <a:buChar char="Ø"/>
             </a:pPr>
             <a:r>
-              <a:rPr lang="en-US" dirty="0"/>
-              <a:t>Xampp for Database management</a:t>
-            </a:r>
+              <a:rPr lang="en-US" dirty="0" smtClean="0"/>
+              <a:t>MySQL Database</a:t>
+            </a:r>
+            <a:endParaRPr lang="en-US" dirty="0"/>
           </a:p>
           <a:p>
             <a:pPr>

</xml_diff>

<commit_message>
Change in reportForm.php user verification
</commit_message>
<xml_diff>
--- a/Crime record management system -1.pptx
+++ b/Crime record management system -1.pptx
@@ -452,7 +452,7 @@
           <a:p>
             <a:fld id="{8247719E-A071-48C4-9162-8C0ACCCA0F96}" type="datetimeFigureOut">
               <a:rPr lang="en-US" smtClean="0"/>
-              <a:t>6/29/2023</a:t>
+              <a:t>6/30/2023</a:t>
             </a:fld>
             <a:endParaRPr lang="en-US"/>
           </a:p>
@@ -776,7 +776,7 @@
           <a:p>
             <a:fld id="{8247719E-A071-48C4-9162-8C0ACCCA0F96}" type="datetimeFigureOut">
               <a:rPr lang="en-US" smtClean="0"/>
-              <a:t>6/29/2023</a:t>
+              <a:t>6/30/2023</a:t>
             </a:fld>
             <a:endParaRPr lang="en-US"/>
           </a:p>
@@ -1024,7 +1024,7 @@
           <a:p>
             <a:fld id="{8247719E-A071-48C4-9162-8C0ACCCA0F96}" type="datetimeFigureOut">
               <a:rPr lang="en-US" smtClean="0"/>
-              <a:t>6/29/2023</a:t>
+              <a:t>6/30/2023</a:t>
             </a:fld>
             <a:endParaRPr lang="en-US"/>
           </a:p>
@@ -1363,7 +1363,7 @@
           <a:p>
             <a:fld id="{8247719E-A071-48C4-9162-8C0ACCCA0F96}" type="datetimeFigureOut">
               <a:rPr lang="en-US" smtClean="0"/>
-              <a:t>6/29/2023</a:t>
+              <a:t>6/30/2023</a:t>
             </a:fld>
             <a:endParaRPr lang="en-US"/>
           </a:p>
@@ -1710,7 +1710,7 @@
           <a:p>
             <a:fld id="{8247719E-A071-48C4-9162-8C0ACCCA0F96}" type="datetimeFigureOut">
               <a:rPr lang="en-US" smtClean="0"/>
-              <a:t>6/29/2023</a:t>
+              <a:t>6/30/2023</a:t>
             </a:fld>
             <a:endParaRPr lang="en-US"/>
           </a:p>
@@ -2084,7 +2084,7 @@
           <a:p>
             <a:fld id="{8247719E-A071-48C4-9162-8C0ACCCA0F96}" type="datetimeFigureOut">
               <a:rPr lang="en-US" smtClean="0"/>
-              <a:t>6/29/2023</a:t>
+              <a:t>6/30/2023</a:t>
             </a:fld>
             <a:endParaRPr lang="en-US"/>
           </a:p>
@@ -2554,7 +2554,7 @@
           <a:p>
             <a:fld id="{8247719E-A071-48C4-9162-8C0ACCCA0F96}" type="datetimeFigureOut">
               <a:rPr lang="en-US" smtClean="0"/>
-              <a:t>6/29/2023</a:t>
+              <a:t>6/30/2023</a:t>
             </a:fld>
             <a:endParaRPr lang="en-US"/>
           </a:p>
@@ -2759,7 +2759,7 @@
           <a:p>
             <a:fld id="{8247719E-A071-48C4-9162-8C0ACCCA0F96}" type="datetimeFigureOut">
               <a:rPr lang="en-US" smtClean="0"/>
-              <a:t>6/29/2023</a:t>
+              <a:t>6/30/2023</a:t>
             </a:fld>
             <a:endParaRPr lang="en-US"/>
           </a:p>
@@ -2970,7 +2970,7 @@
           <a:p>
             <a:fld id="{8247719E-A071-48C4-9162-8C0ACCCA0F96}" type="datetimeFigureOut">
               <a:rPr lang="en-US" smtClean="0"/>
-              <a:t>6/29/2023</a:t>
+              <a:t>6/30/2023</a:t>
             </a:fld>
             <a:endParaRPr lang="en-US"/>
           </a:p>
@@ -3202,7 +3202,7 @@
           <a:p>
             <a:fld id="{8247719E-A071-48C4-9162-8C0ACCCA0F96}" type="datetimeFigureOut">
               <a:rPr lang="en-US" smtClean="0"/>
-              <a:t>6/29/2023</a:t>
+              <a:t>6/30/2023</a:t>
             </a:fld>
             <a:endParaRPr lang="en-US"/>
           </a:p>
@@ -3450,7 +3450,7 @@
           <a:p>
             <a:fld id="{8247719E-A071-48C4-9162-8C0ACCCA0F96}" type="datetimeFigureOut">
               <a:rPr lang="en-US" smtClean="0"/>
-              <a:t>6/29/2023</a:t>
+              <a:t>6/30/2023</a:t>
             </a:fld>
             <a:endParaRPr lang="en-US"/>
           </a:p>
@@ -3748,7 +3748,7 @@
           <a:p>
             <a:fld id="{8247719E-A071-48C4-9162-8C0ACCCA0F96}" type="datetimeFigureOut">
               <a:rPr lang="en-US" smtClean="0"/>
-              <a:t>6/29/2023</a:t>
+              <a:t>6/30/2023</a:t>
             </a:fld>
             <a:endParaRPr lang="en-US"/>
           </a:p>
@@ -4142,7 +4142,7 @@
           <a:p>
             <a:fld id="{8247719E-A071-48C4-9162-8C0ACCCA0F96}" type="datetimeFigureOut">
               <a:rPr lang="en-US" smtClean="0"/>
-              <a:t>6/29/2023</a:t>
+              <a:t>6/30/2023</a:t>
             </a:fld>
             <a:endParaRPr lang="en-US"/>
           </a:p>
@@ -4291,7 +4291,7 @@
           <a:p>
             <a:fld id="{8247719E-A071-48C4-9162-8C0ACCCA0F96}" type="datetimeFigureOut">
               <a:rPr lang="en-US" smtClean="0"/>
-              <a:t>6/29/2023</a:t>
+              <a:t>6/30/2023</a:t>
             </a:fld>
             <a:endParaRPr lang="en-US"/>
           </a:p>
@@ -4417,7 +4417,7 @@
           <a:p>
             <a:fld id="{8247719E-A071-48C4-9162-8C0ACCCA0F96}" type="datetimeFigureOut">
               <a:rPr lang="en-US" smtClean="0"/>
-              <a:t>6/29/2023</a:t>
+              <a:t>6/30/2023</a:t>
             </a:fld>
             <a:endParaRPr lang="en-US"/>
           </a:p>
@@ -4672,7 +4672,7 @@
           <a:p>
             <a:fld id="{8247719E-A071-48C4-9162-8C0ACCCA0F96}" type="datetimeFigureOut">
               <a:rPr lang="en-US" smtClean="0"/>
-              <a:t>6/29/2023</a:t>
+              <a:t>6/30/2023</a:t>
             </a:fld>
             <a:endParaRPr lang="en-US"/>
           </a:p>
@@ -4987,7 +4987,7 @@
           <a:p>
             <a:fld id="{8247719E-A071-48C4-9162-8C0ACCCA0F96}" type="datetimeFigureOut">
               <a:rPr lang="en-US" smtClean="0"/>
-              <a:t>6/29/2023</a:t>
+              <a:t>6/30/2023</a:t>
             </a:fld>
             <a:endParaRPr lang="en-US"/>
           </a:p>
@@ -5338,7 +5338,7 @@
           <a:p>
             <a:fld id="{8247719E-A071-48C4-9162-8C0ACCCA0F96}" type="datetimeFigureOut">
               <a:rPr lang="en-US" smtClean="0"/>
-              <a:t>6/29/2023</a:t>
+              <a:t>6/30/2023</a:t>
             </a:fld>
             <a:endParaRPr lang="en-US"/>
           </a:p>
@@ -6410,8 +6410,13 @@
           <a:p>
             <a:r>
               <a:rPr lang="en-US" dirty="0"/>
-              <a:t>System should be able to do the following</a:t>
-            </a:r>
+              <a:t>System should be able to do the </a:t>
+            </a:r>
+            <a:r>
+              <a:rPr lang="en-US" dirty="0" smtClean="0"/>
+              <a:t>following</a:t>
+            </a:r>
+            <a:endParaRPr lang="en-US" dirty="0"/>
           </a:p>
           <a:p>
             <a:pPr marL="342900" indent="-342900">
@@ -6420,18 +6425,33 @@
             </a:pPr>
             <a:r>
               <a:rPr lang="en-US" dirty="0" smtClean="0"/>
-              <a:t>Case registering</a:t>
-            </a:r>
-            <a:endParaRPr lang="en-US" dirty="0"/>
-          </a:p>
-          <a:p>
-            <a:pPr marL="342900" indent="-342900">
+              <a:t>Case </a:t>
+            </a:r>
+            <a:r>
+              <a:rPr lang="en-US" dirty="0" smtClean="0"/>
+              <a:t>management</a:t>
+            </a:r>
+          </a:p>
+          <a:p>
+            <a:pPr marL="800100" lvl="1" indent="-342900">
               <a:buFont typeface="Wingdings" panose="05000000000000000000" pitchFamily="2" charset="2"/>
               <a:buChar char="Ø"/>
             </a:pPr>
             <a:r>
+              <a:rPr lang="en-US" smtClean="0"/>
+              <a:t>Case registration, </a:t>
+            </a:r>
+            <a:r>
+              <a:rPr lang="en-US" dirty="0"/>
+              <a:t>storage, and retrieval </a:t>
+            </a:r>
+            <a:r>
               <a:rPr lang="en-US" dirty="0" smtClean="0"/>
-              <a:t>Case management</a:t>
+              <a:t>of case </a:t>
+            </a:r>
+            <a:r>
+              <a:rPr lang="en-US" dirty="0"/>
+              <a:t>records</a:t>
             </a:r>
             <a:endParaRPr lang="en-US" dirty="0"/>
           </a:p>

</xml_diff>

<commit_message>
added comments to guidelines and updated powerpoint
</commit_message>
<xml_diff>
--- a/Crime record management system -1.pptx
+++ b/Crime record management system -1.pptx
@@ -452,7 +452,7 @@
           <a:p>
             <a:fld id="{8247719E-A071-48C4-9162-8C0ACCCA0F96}" type="datetimeFigureOut">
               <a:rPr lang="en-US" smtClean="0"/>
-              <a:t>6/30/2023</a:t>
+              <a:t>7/9/2023</a:t>
             </a:fld>
             <a:endParaRPr lang="en-US"/>
           </a:p>
@@ -776,7 +776,7 @@
           <a:p>
             <a:fld id="{8247719E-A071-48C4-9162-8C0ACCCA0F96}" type="datetimeFigureOut">
               <a:rPr lang="en-US" smtClean="0"/>
-              <a:t>6/30/2023</a:t>
+              <a:t>7/9/2023</a:t>
             </a:fld>
             <a:endParaRPr lang="en-US"/>
           </a:p>
@@ -1024,7 +1024,7 @@
           <a:p>
             <a:fld id="{8247719E-A071-48C4-9162-8C0ACCCA0F96}" type="datetimeFigureOut">
               <a:rPr lang="en-US" smtClean="0"/>
-              <a:t>6/30/2023</a:t>
+              <a:t>7/9/2023</a:t>
             </a:fld>
             <a:endParaRPr lang="en-US"/>
           </a:p>
@@ -1363,7 +1363,7 @@
           <a:p>
             <a:fld id="{8247719E-A071-48C4-9162-8C0ACCCA0F96}" type="datetimeFigureOut">
               <a:rPr lang="en-US" smtClean="0"/>
-              <a:t>6/30/2023</a:t>
+              <a:t>7/9/2023</a:t>
             </a:fld>
             <a:endParaRPr lang="en-US"/>
           </a:p>
@@ -1710,7 +1710,7 @@
           <a:p>
             <a:fld id="{8247719E-A071-48C4-9162-8C0ACCCA0F96}" type="datetimeFigureOut">
               <a:rPr lang="en-US" smtClean="0"/>
-              <a:t>6/30/2023</a:t>
+              <a:t>7/9/2023</a:t>
             </a:fld>
             <a:endParaRPr lang="en-US"/>
           </a:p>
@@ -2084,7 +2084,7 @@
           <a:p>
             <a:fld id="{8247719E-A071-48C4-9162-8C0ACCCA0F96}" type="datetimeFigureOut">
               <a:rPr lang="en-US" smtClean="0"/>
-              <a:t>6/30/2023</a:t>
+              <a:t>7/9/2023</a:t>
             </a:fld>
             <a:endParaRPr lang="en-US"/>
           </a:p>
@@ -2554,7 +2554,7 @@
           <a:p>
             <a:fld id="{8247719E-A071-48C4-9162-8C0ACCCA0F96}" type="datetimeFigureOut">
               <a:rPr lang="en-US" smtClean="0"/>
-              <a:t>6/30/2023</a:t>
+              <a:t>7/9/2023</a:t>
             </a:fld>
             <a:endParaRPr lang="en-US"/>
           </a:p>
@@ -2759,7 +2759,7 @@
           <a:p>
             <a:fld id="{8247719E-A071-48C4-9162-8C0ACCCA0F96}" type="datetimeFigureOut">
               <a:rPr lang="en-US" smtClean="0"/>
-              <a:t>6/30/2023</a:t>
+              <a:t>7/9/2023</a:t>
             </a:fld>
             <a:endParaRPr lang="en-US"/>
           </a:p>
@@ -2970,7 +2970,7 @@
           <a:p>
             <a:fld id="{8247719E-A071-48C4-9162-8C0ACCCA0F96}" type="datetimeFigureOut">
               <a:rPr lang="en-US" smtClean="0"/>
-              <a:t>6/30/2023</a:t>
+              <a:t>7/9/2023</a:t>
             </a:fld>
             <a:endParaRPr lang="en-US"/>
           </a:p>
@@ -3202,7 +3202,7 @@
           <a:p>
             <a:fld id="{8247719E-A071-48C4-9162-8C0ACCCA0F96}" type="datetimeFigureOut">
               <a:rPr lang="en-US" smtClean="0"/>
-              <a:t>6/30/2023</a:t>
+              <a:t>7/9/2023</a:t>
             </a:fld>
             <a:endParaRPr lang="en-US"/>
           </a:p>
@@ -3450,7 +3450,7 @@
           <a:p>
             <a:fld id="{8247719E-A071-48C4-9162-8C0ACCCA0F96}" type="datetimeFigureOut">
               <a:rPr lang="en-US" smtClean="0"/>
-              <a:t>6/30/2023</a:t>
+              <a:t>7/9/2023</a:t>
             </a:fld>
             <a:endParaRPr lang="en-US"/>
           </a:p>
@@ -3748,7 +3748,7 @@
           <a:p>
             <a:fld id="{8247719E-A071-48C4-9162-8C0ACCCA0F96}" type="datetimeFigureOut">
               <a:rPr lang="en-US" smtClean="0"/>
-              <a:t>6/30/2023</a:t>
+              <a:t>7/9/2023</a:t>
             </a:fld>
             <a:endParaRPr lang="en-US"/>
           </a:p>
@@ -4142,7 +4142,7 @@
           <a:p>
             <a:fld id="{8247719E-A071-48C4-9162-8C0ACCCA0F96}" type="datetimeFigureOut">
               <a:rPr lang="en-US" smtClean="0"/>
-              <a:t>6/30/2023</a:t>
+              <a:t>7/9/2023</a:t>
             </a:fld>
             <a:endParaRPr lang="en-US"/>
           </a:p>
@@ -4291,7 +4291,7 @@
           <a:p>
             <a:fld id="{8247719E-A071-48C4-9162-8C0ACCCA0F96}" type="datetimeFigureOut">
               <a:rPr lang="en-US" smtClean="0"/>
-              <a:t>6/30/2023</a:t>
+              <a:t>7/9/2023</a:t>
             </a:fld>
             <a:endParaRPr lang="en-US"/>
           </a:p>
@@ -4417,7 +4417,7 @@
           <a:p>
             <a:fld id="{8247719E-A071-48C4-9162-8C0ACCCA0F96}" type="datetimeFigureOut">
               <a:rPr lang="en-US" smtClean="0"/>
-              <a:t>6/30/2023</a:t>
+              <a:t>7/9/2023</a:t>
             </a:fld>
             <a:endParaRPr lang="en-US"/>
           </a:p>
@@ -4672,7 +4672,7 @@
           <a:p>
             <a:fld id="{8247719E-A071-48C4-9162-8C0ACCCA0F96}" type="datetimeFigureOut">
               <a:rPr lang="en-US" smtClean="0"/>
-              <a:t>6/30/2023</a:t>
+              <a:t>7/9/2023</a:t>
             </a:fld>
             <a:endParaRPr lang="en-US"/>
           </a:p>
@@ -4987,7 +4987,7 @@
           <a:p>
             <a:fld id="{8247719E-A071-48C4-9162-8C0ACCCA0F96}" type="datetimeFigureOut">
               <a:rPr lang="en-US" smtClean="0"/>
-              <a:t>6/30/2023</a:t>
+              <a:t>7/9/2023</a:t>
             </a:fld>
             <a:endParaRPr lang="en-US"/>
           </a:p>
@@ -5338,7 +5338,7 @@
           <a:p>
             <a:fld id="{8247719E-A071-48C4-9162-8C0ACCCA0F96}" type="datetimeFigureOut">
               <a:rPr lang="en-US" smtClean="0"/>
-              <a:t>6/30/2023</a:t>
+              <a:t>7/9/2023</a:t>
             </a:fld>
             <a:endParaRPr lang="en-US"/>
           </a:p>
@@ -5893,7 +5893,7 @@
         </p:nvSpPr>
         <p:spPr>
           <a:xfrm>
-            <a:off x="0" y="1777333"/>
+            <a:off x="0" y="1845067"/>
             <a:ext cx="12192000" cy="3303334"/>
           </a:xfrm>
         </p:spPr>
@@ -5936,23 +5936,11 @@
                 <a:latin typeface="Arial Black" panose="020B0A04020102020204" pitchFamily="34" charset="0"/>
               </a:rPr>
             </a:br>
-            <a:r>
-              <a:rPr lang="en-US" sz="4000" b="1" dirty="0">
-                <a:latin typeface="Arial Black" panose="020B0A04020102020204" pitchFamily="34" charset="0"/>
-              </a:rPr>
-              <a:t/>
-            </a:r>
             <a:br>
               <a:rPr lang="en-US" sz="4000" b="1" dirty="0">
                 <a:latin typeface="Arial Black" panose="020B0A04020102020204" pitchFamily="34" charset="0"/>
               </a:rPr>
             </a:br>
-            <a:r>
-              <a:rPr lang="en-US" sz="4000" b="1" dirty="0">
-                <a:latin typeface="Arial Black" panose="020B0A04020102020204" pitchFamily="34" charset="0"/>
-              </a:rPr>
-              <a:t/>
-            </a:r>
             <a:br>
               <a:rPr lang="en-US" sz="4000" b="1" dirty="0">
                 <a:latin typeface="Arial Black" panose="020B0A04020102020204" pitchFamily="34" charset="0"/>
@@ -6404,19 +6392,14 @@
         <p:spPr/>
         <p:txBody>
           <a:bodyPr>
-            <a:normAutofit/>
+            <a:normAutofit lnSpcReduction="10000"/>
           </a:bodyPr>
           <a:lstStyle/>
           <a:p>
             <a:r>
               <a:rPr lang="en-US" dirty="0"/>
-              <a:t>System should be able to do the </a:t>
-            </a:r>
-            <a:r>
-              <a:rPr lang="en-US" dirty="0" smtClean="0"/>
-              <a:t>following</a:t>
-            </a:r>
-            <a:endParaRPr lang="en-US" dirty="0"/>
+              <a:t>System should be able to do the following</a:t>
+            </a:r>
           </a:p>
           <a:p>
             <a:pPr marL="342900" indent="-342900">
@@ -6424,36 +6407,27 @@
               <a:buChar char="Ø"/>
             </a:pPr>
             <a:r>
-              <a:rPr lang="en-US" dirty="0" smtClean="0"/>
-              <a:t>Case </a:t>
-            </a:r>
-            <a:r>
-              <a:rPr lang="en-US" dirty="0" smtClean="0"/>
-              <a:t>management</a:t>
-            </a:r>
-          </a:p>
-          <a:p>
-            <a:pPr marL="800100" lvl="1" indent="-342900">
-              <a:buFont typeface="Wingdings" panose="05000000000000000000" pitchFamily="2" charset="2"/>
-              <a:buChar char="Ø"/>
+              <a:rPr lang="en-US" dirty="0"/>
+              <a:t>Case management</a:t>
+            </a:r>
+          </a:p>
+          <a:p>
+            <a:pPr marL="0" indent="0">
+              <a:buNone/>
             </a:pPr>
             <a:r>
-              <a:rPr lang="en-US" smtClean="0"/>
-              <a:t>Case registration, </a:t>
-            </a:r>
-            <a:r>
               <a:rPr lang="en-US" dirty="0"/>
-              <a:t>storage, and retrieval </a:t>
-            </a:r>
-            <a:r>
-              <a:rPr lang="en-US" dirty="0" smtClean="0"/>
-              <a:t>of case </a:t>
-            </a:r>
+              <a:t>    . Registration</a:t>
+            </a:r>
+          </a:p>
+          <a:p>
+            <a:pPr marL="0" indent="0">
+              <a:buNone/>
+            </a:pPr>
             <a:r>
               <a:rPr lang="en-US" dirty="0"/>
-              <a:t>records</a:t>
-            </a:r>
-            <a:endParaRPr lang="en-US" dirty="0"/>
+              <a:t>    . Storage    . Retrieval </a:t>
+            </a:r>
           </a:p>
           <a:p>
             <a:pPr marL="342900" indent="-342900">
@@ -6462,13 +6436,26 @@
             </a:pPr>
             <a:r>
               <a:rPr lang="en-US" dirty="0"/>
-              <a:t>Generate </a:t>
-            </a:r>
-            <a:r>
-              <a:rPr lang="en-US" dirty="0" smtClean="0"/>
-              <a:t>reports</a:t>
-            </a:r>
-            <a:endParaRPr lang="en-US" dirty="0"/>
+              <a:t> Cases analysis</a:t>
+            </a:r>
+          </a:p>
+          <a:p>
+            <a:pPr marL="0" indent="0">
+              <a:buNone/>
+            </a:pPr>
+            <a:r>
+              <a:rPr lang="en-US" dirty="0"/>
+              <a:t>     . Filtering and Customization</a:t>
+            </a:r>
+          </a:p>
+          <a:p>
+            <a:pPr marL="0" indent="0">
+              <a:buNone/>
+            </a:pPr>
+            <a:r>
+              <a:rPr lang="en-US" dirty="0"/>
+              <a:t>     . Reports Generation</a:t>
+            </a:r>
           </a:p>
         </p:txBody>
       </p:sp>
@@ -7199,10 +7186,9 @@
               <a:buChar char="Ø"/>
             </a:pPr>
             <a:r>
-              <a:rPr lang="en-US" dirty="0" smtClean="0"/>
+              <a:rPr lang="en-US" dirty="0"/>
               <a:t>MySQL Database</a:t>
             </a:r>
-            <a:endParaRPr lang="en-US" dirty="0"/>
           </a:p>
           <a:p>
             <a:pPr>

</xml_diff>